<commit_message>
Commit for Launch on AWS
</commit_message>
<xml_diff>
--- a/CareerPlanApp.pptx
+++ b/CareerPlanApp.pptx
@@ -11,17 +11,18 @@
     <p:sldId id="259" r:id="rId5"/>
     <p:sldId id="260" r:id="rId6"/>
     <p:sldId id="261" r:id="rId7"/>
-    <p:sldId id="262" r:id="rId8"/>
-    <p:sldId id="263" r:id="rId9"/>
-    <p:sldId id="267" r:id="rId10"/>
-    <p:sldId id="264" r:id="rId11"/>
-    <p:sldId id="265" r:id="rId12"/>
-    <p:sldId id="266" r:id="rId13"/>
+    <p:sldId id="268" r:id="rId8"/>
+    <p:sldId id="262" r:id="rId9"/>
+    <p:sldId id="263" r:id="rId10"/>
+    <p:sldId id="267" r:id="rId11"/>
+    <p:sldId id="264" r:id="rId12"/>
+    <p:sldId id="265" r:id="rId13"/>
+    <p:sldId id="266" r:id="rId14"/>
   </p:sldIdLst>
   <p:sldSz cx="12192000" cy="6858000"/>
   <p:notesSz cx="6858000" cy="9144000"/>
   <p:custDataLst>
-    <p:tags r:id="rId14"/>
+    <p:tags r:id="rId15"/>
   </p:custDataLst>
   <p:defaultTextStyle>
     <a:defPPr>
@@ -2827,7 +2828,7 @@
           <a:graphicData uri="http://schemas.openxmlformats.org/presentationml/2006/ole">
             <mc:AlternateContent xmlns:mc="http://schemas.openxmlformats.org/markup-compatibility/2006">
               <mc:Choice xmlns:v="urn:schemas-microsoft-com:vml" Requires="v">
-                <p:oleObj spid="_x0000_s1043" name="think-cell Slide" r:id="rId15" imgW="415" imgH="416" progId="TCLayout.ActiveDocument.1">
+                <p:oleObj spid="_x0000_s1045" name="think-cell Slide" r:id="rId15" imgW="415" imgH="416" progId="TCLayout.ActiveDocument.1">
                   <p:embed/>
                 </p:oleObj>
               </mc:Choice>
@@ -3458,7 +3459,7 @@
           <a:graphicData uri="http://schemas.openxmlformats.org/presentationml/2006/ole">
             <mc:AlternateContent xmlns:mc="http://schemas.openxmlformats.org/markup-compatibility/2006">
               <mc:Choice xmlns:v="urn:schemas-microsoft-com:vml" Requires="v">
-                <p:oleObj spid="_x0000_s2067" name="think-cell Slide" r:id="rId4" imgW="415" imgH="416" progId="TCLayout.ActiveDocument.1">
+                <p:oleObj spid="_x0000_s2069" name="think-cell Slide" r:id="rId4" imgW="415" imgH="416" progId="TCLayout.ActiveDocument.1">
                   <p:embed/>
                 </p:oleObj>
               </mc:Choice>
@@ -3589,7 +3590,7 @@
           <p:cNvPr id="4" name="Object 3" hidden="1">
             <a:extLst>
               <a:ext uri="{FF2B5EF4-FFF2-40B4-BE49-F238E27FC236}">
-                <a16:creationId xmlns:a16="http://schemas.microsoft.com/office/drawing/2014/main" id="{98A69EAE-9C5E-4A61-A78A-7B373C7F38D8}"/>
+                <a16:creationId xmlns:a16="http://schemas.microsoft.com/office/drawing/2014/main" id="{AD039125-C7BE-4241-B30F-5EC9EFB4DD12}"/>
               </a:ext>
             </a:extLst>
           </p:cNvPr>
@@ -3602,7 +3603,7 @@
             </p:custDataLst>
             <p:extLst>
               <p:ext uri="{D42A27DB-BD31-4B8C-83A1-F6EECF244321}">
-                <p14:modId xmlns:p14="http://schemas.microsoft.com/office/powerpoint/2010/main" val="2042138508"/>
+                <p14:modId xmlns:p14="http://schemas.microsoft.com/office/powerpoint/2010/main" val="2031764387"/>
               </p:ext>
             </p:extLst>
           </p:nvPr>
@@ -3615,7 +3616,7 @@
           <a:graphicData uri="http://schemas.openxmlformats.org/presentationml/2006/ole">
             <mc:AlternateContent xmlns:mc="http://schemas.openxmlformats.org/markup-compatibility/2006">
               <mc:Choice xmlns:v="urn:schemas-microsoft-com:vml" Requires="v">
-                <p:oleObj spid="_x0000_s10248" name="think-cell Slide" r:id="rId4" imgW="415" imgH="416" progId="TCLayout.ActiveDocument.1">
+                <p:oleObj spid="_x0000_s13317" name="think-cell Slide" r:id="rId4" imgW="415" imgH="416" progId="TCLayout.ActiveDocument.1">
                   <p:embed/>
                 </p:oleObj>
               </mc:Choice>
@@ -3655,7 +3656,7 @@
           <p:cNvPr id="2" name="Title 1">
             <a:extLst>
               <a:ext uri="{FF2B5EF4-FFF2-40B4-BE49-F238E27FC236}">
-                <a16:creationId xmlns:a16="http://schemas.microsoft.com/office/drawing/2014/main" id="{9A3DC0B7-C20A-4BA2-97B4-7570F12130B5}"/>
+                <a16:creationId xmlns:a16="http://schemas.microsoft.com/office/drawing/2014/main" id="{C7E2027B-26E7-4920-8536-4A2F8304954E}"/>
               </a:ext>
             </a:extLst>
           </p:cNvPr>
@@ -3672,43 +3673,47 @@
           <a:lstStyle/>
           <a:p>
             <a:r>
+              <a:rPr lang="en-GB" dirty="0" err="1"/>
+              <a:t>Category_Person</a:t>
+            </a:r>
+            <a:endParaRPr lang="en-GB" dirty="0"/>
+          </a:p>
+        </p:txBody>
+      </p:sp>
+      <p:sp>
+        <p:nvSpPr>
+          <p:cNvPr id="3" name="Content Placeholder 2">
+            <a:extLst>
+              <a:ext uri="{FF2B5EF4-FFF2-40B4-BE49-F238E27FC236}">
+                <a16:creationId xmlns:a16="http://schemas.microsoft.com/office/drawing/2014/main" id="{2376575B-3421-4443-BBA4-DFDBD6BDEB98}"/>
+              </a:ext>
+            </a:extLst>
+          </p:cNvPr>
+          <p:cNvSpPr>
+            <a:spLocks noGrp="1"/>
+          </p:cNvSpPr>
+          <p:nvPr>
+            <p:ph idx="1"/>
+          </p:nvPr>
+        </p:nvSpPr>
+        <p:spPr/>
+        <p:txBody>
+          <a:bodyPr/>
+          <a:lstStyle/>
+          <a:p>
+            <a:r>
+              <a:rPr lang="en-GB" dirty="0" err="1"/>
+              <a:t>Category_ID</a:t>
+            </a:r>
+            <a:r>
               <a:rPr lang="en-GB" dirty="0"/>
-              <a:t>Goal</a:t>
-            </a:r>
-          </a:p>
-        </p:txBody>
-      </p:sp>
-      <p:sp>
-        <p:nvSpPr>
-          <p:cNvPr id="3" name="Content Placeholder 2">
-            <a:extLst>
-              <a:ext uri="{FF2B5EF4-FFF2-40B4-BE49-F238E27FC236}">
-                <a16:creationId xmlns:a16="http://schemas.microsoft.com/office/drawing/2014/main" id="{230BF048-ADF7-44A7-84D3-7D6A7990DF30}"/>
-              </a:ext>
-            </a:extLst>
-          </p:cNvPr>
-          <p:cNvSpPr>
-            <a:spLocks noGrp="1"/>
-          </p:cNvSpPr>
-          <p:nvPr>
-            <p:ph idx="1"/>
-          </p:nvPr>
-        </p:nvSpPr>
-        <p:spPr/>
-        <p:txBody>
-          <a:bodyPr/>
-          <a:lstStyle/>
-          <a:p>
-            <a:r>
-              <a:rPr lang="en-GB" dirty="0" err="1"/>
-              <a:t>Shortname</a:t>
-            </a:r>
-            <a:endParaRPr lang="en-GB" dirty="0"/>
+              <a:t> (can be null)</a:t>
+            </a:r>
           </a:p>
           <a:p>
             <a:r>
               <a:rPr lang="en-GB" dirty="0"/>
-              <a:t>Name</a:t>
+              <a:t>Name </a:t>
             </a:r>
           </a:p>
           <a:p>
@@ -3720,14 +3725,7 @@
           <a:p>
             <a:r>
               <a:rPr lang="en-GB" dirty="0" err="1"/>
-              <a:t>Duedate</a:t>
-            </a:r>
-            <a:endParaRPr lang="en-GB" dirty="0"/>
-          </a:p>
-          <a:p>
-            <a:r>
-              <a:rPr lang="en-GB" dirty="0" err="1"/>
-              <a:t>Category_Person_ID</a:t>
+              <a:t>Color</a:t>
             </a:r>
             <a:endParaRPr lang="en-GB" dirty="0"/>
           </a:p>
@@ -3746,7 +3744,7 @@
     </p:spTree>
     <p:extLst>
       <p:ext uri="{BB962C8B-B14F-4D97-AF65-F5344CB8AC3E}">
-        <p14:creationId xmlns:p14="http://schemas.microsoft.com/office/powerpoint/2010/main" val="2641032494"/>
+        <p14:creationId xmlns:p14="http://schemas.microsoft.com/office/powerpoint/2010/main" val="2450218261"/>
       </p:ext>
     </p:extLst>
   </p:cSld>
@@ -3778,7 +3776,7 @@
           <p:cNvPr id="4" name="Object 3" hidden="1">
             <a:extLst>
               <a:ext uri="{FF2B5EF4-FFF2-40B4-BE49-F238E27FC236}">
-                <a16:creationId xmlns:a16="http://schemas.microsoft.com/office/drawing/2014/main" id="{4406AFE8-724D-49E7-B787-52100D31CDFC}"/>
+                <a16:creationId xmlns:a16="http://schemas.microsoft.com/office/drawing/2014/main" id="{98A69EAE-9C5E-4A61-A78A-7B373C7F38D8}"/>
               </a:ext>
             </a:extLst>
           </p:cNvPr>
@@ -3791,7 +3789,7 @@
             </p:custDataLst>
             <p:extLst>
               <p:ext uri="{D42A27DB-BD31-4B8C-83A1-F6EECF244321}">
-                <p14:modId xmlns:p14="http://schemas.microsoft.com/office/powerpoint/2010/main" val="1431356006"/>
+                <p14:modId xmlns:p14="http://schemas.microsoft.com/office/powerpoint/2010/main" val="2042138508"/>
               </p:ext>
             </p:extLst>
           </p:nvPr>
@@ -3804,7 +3802,7 @@
           <a:graphicData uri="http://schemas.openxmlformats.org/presentationml/2006/ole">
             <mc:AlternateContent xmlns:mc="http://schemas.openxmlformats.org/markup-compatibility/2006">
               <mc:Choice xmlns:v="urn:schemas-microsoft-com:vml" Requires="v">
-                <p:oleObj spid="_x0000_s11270" name="think-cell Slide" r:id="rId4" imgW="415" imgH="416" progId="TCLayout.ActiveDocument.1">
+                <p:oleObj spid="_x0000_s10250" name="think-cell Slide" r:id="rId4" imgW="415" imgH="416" progId="TCLayout.ActiveDocument.1">
                   <p:embed/>
                 </p:oleObj>
               </mc:Choice>
@@ -3844,7 +3842,7 @@
           <p:cNvPr id="2" name="Title 1">
             <a:extLst>
               <a:ext uri="{FF2B5EF4-FFF2-40B4-BE49-F238E27FC236}">
-                <a16:creationId xmlns:a16="http://schemas.microsoft.com/office/drawing/2014/main" id="{560A6661-1523-4146-AE2A-4A0D94D43CDE}"/>
+                <a16:creationId xmlns:a16="http://schemas.microsoft.com/office/drawing/2014/main" id="{9A3DC0B7-C20A-4BA2-97B4-7570F12130B5}"/>
               </a:ext>
             </a:extLst>
           </p:cNvPr>
@@ -3862,7 +3860,7 @@
           <a:p>
             <a:r>
               <a:rPr lang="en-GB" dirty="0"/>
-              <a:t>Objective</a:t>
+              <a:t>Goal</a:t>
             </a:r>
           </a:p>
         </p:txBody>
@@ -3872,7 +3870,7 @@
           <p:cNvPr id="3" name="Content Placeholder 2">
             <a:extLst>
               <a:ext uri="{FF2B5EF4-FFF2-40B4-BE49-F238E27FC236}">
-                <a16:creationId xmlns:a16="http://schemas.microsoft.com/office/drawing/2014/main" id="{ADCFBDA9-743D-483E-AA89-F9ED62885A49}"/>
+                <a16:creationId xmlns:a16="http://schemas.microsoft.com/office/drawing/2014/main" id="{230BF048-ADF7-44A7-84D3-7D6A7990DF30}"/>
               </a:ext>
             </a:extLst>
           </p:cNvPr>
@@ -3908,14 +3906,15 @@
           </a:p>
           <a:p>
             <a:r>
-              <a:rPr lang="en-GB" dirty="0"/>
-              <a:t>Due-date</a:t>
-            </a:r>
-          </a:p>
-          <a:p>
-            <a:r>
               <a:rPr lang="en-GB" dirty="0" err="1"/>
-              <a:t>Goal_ID</a:t>
+              <a:t>Duedate</a:t>
+            </a:r>
+            <a:endParaRPr lang="en-GB" dirty="0"/>
+          </a:p>
+          <a:p>
+            <a:r>
+              <a:rPr lang="en-GB" dirty="0" err="1"/>
+              <a:t>Category_Person_ID</a:t>
             </a:r>
             <a:endParaRPr lang="en-GB" dirty="0"/>
           </a:p>
@@ -3924,12 +3923,6 @@
               <a:rPr lang="en-GB" dirty="0" err="1"/>
               <a:t>Profile_ID</a:t>
             </a:r>
-            <a:endParaRPr lang="en-GB" dirty="0"/>
-          </a:p>
-          <a:p>
-            <a:pPr marL="0" indent="0">
-              <a:buNone/>
-            </a:pPr>
             <a:endParaRPr lang="en-GB" dirty="0"/>
           </a:p>
           <a:p>
@@ -3940,7 +3933,7 @@
     </p:spTree>
     <p:extLst>
       <p:ext uri="{BB962C8B-B14F-4D97-AF65-F5344CB8AC3E}">
-        <p14:creationId xmlns:p14="http://schemas.microsoft.com/office/powerpoint/2010/main" val="2057361514"/>
+        <p14:creationId xmlns:p14="http://schemas.microsoft.com/office/powerpoint/2010/main" val="2641032494"/>
       </p:ext>
     </p:extLst>
   </p:cSld>
@@ -3972,7 +3965,7 @@
           <p:cNvPr id="4" name="Object 3" hidden="1">
             <a:extLst>
               <a:ext uri="{FF2B5EF4-FFF2-40B4-BE49-F238E27FC236}">
-                <a16:creationId xmlns:a16="http://schemas.microsoft.com/office/drawing/2014/main" id="{EB91F5E0-F371-49DE-A532-99D7590310A1}"/>
+                <a16:creationId xmlns:a16="http://schemas.microsoft.com/office/drawing/2014/main" id="{4406AFE8-724D-49E7-B787-52100D31CDFC}"/>
               </a:ext>
             </a:extLst>
           </p:cNvPr>
@@ -3985,7 +3978,7 @@
             </p:custDataLst>
             <p:extLst>
               <p:ext uri="{D42A27DB-BD31-4B8C-83A1-F6EECF244321}">
-                <p14:modId xmlns:p14="http://schemas.microsoft.com/office/powerpoint/2010/main" val="3983092889"/>
+                <p14:modId xmlns:p14="http://schemas.microsoft.com/office/powerpoint/2010/main" val="1431356006"/>
               </p:ext>
             </p:extLst>
           </p:nvPr>
@@ -3998,7 +3991,7 @@
           <a:graphicData uri="http://schemas.openxmlformats.org/presentationml/2006/ole">
             <mc:AlternateContent xmlns:mc="http://schemas.openxmlformats.org/markup-compatibility/2006">
               <mc:Choice xmlns:v="urn:schemas-microsoft-com:vml" Requires="v">
-                <p:oleObj spid="_x0000_s12292" name="think-cell Slide" r:id="rId4" imgW="415" imgH="416" progId="TCLayout.ActiveDocument.1">
+                <p:oleObj spid="_x0000_s11272" name="think-cell Slide" r:id="rId4" imgW="415" imgH="416" progId="TCLayout.ActiveDocument.1">
                   <p:embed/>
                 </p:oleObj>
               </mc:Choice>
@@ -4038,7 +4031,7 @@
           <p:cNvPr id="2" name="Title 1">
             <a:extLst>
               <a:ext uri="{FF2B5EF4-FFF2-40B4-BE49-F238E27FC236}">
-                <a16:creationId xmlns:a16="http://schemas.microsoft.com/office/drawing/2014/main" id="{EB47ACC5-C731-4948-9227-5B274BC494B3}"/>
+                <a16:creationId xmlns:a16="http://schemas.microsoft.com/office/drawing/2014/main" id="{560A6661-1523-4146-AE2A-4A0D94D43CDE}"/>
               </a:ext>
             </a:extLst>
           </p:cNvPr>
@@ -4056,7 +4049,7 @@
           <a:p>
             <a:r>
               <a:rPr lang="en-GB" dirty="0"/>
-              <a:t>Task</a:t>
+              <a:t>Objective</a:t>
             </a:r>
           </a:p>
         </p:txBody>
@@ -4066,7 +4059,7 @@
           <p:cNvPr id="3" name="Content Placeholder 2">
             <a:extLst>
               <a:ext uri="{FF2B5EF4-FFF2-40B4-BE49-F238E27FC236}">
-                <a16:creationId xmlns:a16="http://schemas.microsoft.com/office/drawing/2014/main" id="{F3AC7449-F7C4-4414-A9FE-9FCAFE1219A4}"/>
+                <a16:creationId xmlns:a16="http://schemas.microsoft.com/office/drawing/2014/main" id="{ADCFBDA9-743D-483E-AA89-F9ED62885A49}"/>
               </a:ext>
             </a:extLst>
           </p:cNvPr>
@@ -4116,21 +4109,17 @@
           <a:p>
             <a:r>
               <a:rPr lang="en-GB" dirty="0" err="1"/>
-              <a:t>Parent_Task_ID</a:t>
+              <a:t>Profile_ID</a:t>
             </a:r>
             <a:endParaRPr lang="en-GB" dirty="0"/>
           </a:p>
           <a:p>
-            <a:r>
-              <a:rPr lang="en-GB" dirty="0" err="1"/>
-              <a:t>Profile_ID</a:t>
-            </a:r>
+            <a:pPr marL="0" indent="0">
+              <a:buNone/>
+            </a:pPr>
             <a:endParaRPr lang="en-GB" dirty="0"/>
           </a:p>
           <a:p>
-            <a:pPr marL="0" indent="0">
-              <a:buNone/>
-            </a:pPr>
             <a:endParaRPr lang="en-GB" dirty="0"/>
           </a:p>
         </p:txBody>
@@ -4138,7 +4127,7 @@
     </p:spTree>
     <p:extLst>
       <p:ext uri="{BB962C8B-B14F-4D97-AF65-F5344CB8AC3E}">
-        <p14:creationId xmlns:p14="http://schemas.microsoft.com/office/powerpoint/2010/main" val="4068738218"/>
+        <p14:creationId xmlns:p14="http://schemas.microsoft.com/office/powerpoint/2010/main" val="2057361514"/>
       </p:ext>
     </p:extLst>
   </p:cSld>
@@ -4148,7 +4137,7 @@
 </p:sld>
 </file>
 
-<file path=ppt/slides/slide2.xml><?xml version="1.0" encoding="utf-8"?>
+<file path=ppt/slides/slide13.xml><?xml version="1.0" encoding="utf-8"?>
 <p:sld xmlns:a="http://schemas.openxmlformats.org/drawingml/2006/main" xmlns:r="http://schemas.openxmlformats.org/officeDocument/2006/relationships" xmlns:p="http://schemas.openxmlformats.org/presentationml/2006/main">
   <p:cSld>
     <p:spTree>
@@ -4170,7 +4159,7 @@
           <p:cNvPr id="4" name="Object 3" hidden="1">
             <a:extLst>
               <a:ext uri="{FF2B5EF4-FFF2-40B4-BE49-F238E27FC236}">
-                <a16:creationId xmlns:a16="http://schemas.microsoft.com/office/drawing/2014/main" id="{A4F420FA-7182-4F8C-A69D-9AB55C3BBB29}"/>
+                <a16:creationId xmlns:a16="http://schemas.microsoft.com/office/drawing/2014/main" id="{EB91F5E0-F371-49DE-A532-99D7590310A1}"/>
               </a:ext>
             </a:extLst>
           </p:cNvPr>
@@ -4183,7 +4172,7 @@
             </p:custDataLst>
             <p:extLst>
               <p:ext uri="{D42A27DB-BD31-4B8C-83A1-F6EECF244321}">
-                <p14:modId xmlns:p14="http://schemas.microsoft.com/office/powerpoint/2010/main" val="859402090"/>
+                <p14:modId xmlns:p14="http://schemas.microsoft.com/office/powerpoint/2010/main" val="3983092889"/>
               </p:ext>
             </p:extLst>
           </p:nvPr>
@@ -4196,7 +4185,7 @@
           <a:graphicData uri="http://schemas.openxmlformats.org/presentationml/2006/ole">
             <mc:AlternateContent xmlns:mc="http://schemas.openxmlformats.org/markup-compatibility/2006">
               <mc:Choice xmlns:v="urn:schemas-microsoft-com:vml" Requires="v">
-                <p:oleObj spid="_x0000_s3091" name="think-cell Slide" r:id="rId4" imgW="415" imgH="416" progId="TCLayout.ActiveDocument.1">
+                <p:oleObj spid="_x0000_s12294" name="think-cell Slide" r:id="rId4" imgW="415" imgH="416" progId="TCLayout.ActiveDocument.1">
                   <p:embed/>
                 </p:oleObj>
               </mc:Choice>
@@ -4236,7 +4225,7 @@
           <p:cNvPr id="2" name="Title 1">
             <a:extLst>
               <a:ext uri="{FF2B5EF4-FFF2-40B4-BE49-F238E27FC236}">
-                <a16:creationId xmlns:a16="http://schemas.microsoft.com/office/drawing/2014/main" id="{EFA15CA1-7168-4627-A6D4-8CD66543E71B}"/>
+                <a16:creationId xmlns:a16="http://schemas.microsoft.com/office/drawing/2014/main" id="{EB47ACC5-C731-4948-9227-5B274BC494B3}"/>
               </a:ext>
             </a:extLst>
           </p:cNvPr>
@@ -4254,7 +4243,7 @@
           <a:p>
             <a:r>
               <a:rPr lang="en-GB" dirty="0"/>
-              <a:t>Vision</a:t>
+              <a:t>Task</a:t>
             </a:r>
           </a:p>
         </p:txBody>
@@ -4264,7 +4253,7 @@
           <p:cNvPr id="3" name="Content Placeholder 2">
             <a:extLst>
               <a:ext uri="{FF2B5EF4-FFF2-40B4-BE49-F238E27FC236}">
-                <a16:creationId xmlns:a16="http://schemas.microsoft.com/office/drawing/2014/main" id="{B75A6FF2-79ED-41E1-8B9E-6D55C4C1655A}"/>
+                <a16:creationId xmlns:a16="http://schemas.microsoft.com/office/drawing/2014/main" id="{F3AC7449-F7C4-4414-A9FE-9FCAFE1219A4}"/>
               </a:ext>
             </a:extLst>
           </p:cNvPr>
@@ -4277,55 +4266,66 @@
         </p:nvSpPr>
         <p:spPr/>
         <p:txBody>
-          <a:bodyPr>
-            <a:normAutofit/>
-          </a:bodyPr>
-          <a:lstStyle/>
-          <a:p>
-            <a:r>
-              <a:rPr lang="en-GB" sz="2400" dirty="0"/>
-              <a:t>Create an application that allows people to create visual plans for their lives </a:t>
-            </a:r>
-          </a:p>
-          <a:p>
-            <a:r>
-              <a:rPr lang="en-GB" sz="2400" dirty="0"/>
-              <a:t>It allows them to create goals, with milestones, results and concrete actions</a:t>
-            </a:r>
-          </a:p>
-          <a:p>
-            <a:r>
-              <a:rPr lang="en-GB" sz="2400" dirty="0"/>
-              <a:t>I helps you think through your life strategically, but with sufficient support to see across goals to prevent tunnel vision </a:t>
-            </a:r>
-          </a:p>
-          <a:p>
-            <a:r>
-              <a:rPr lang="en-GB" sz="2400" dirty="0"/>
-              <a:t>In the end, it should be based on research and should also support people in planning a healthy and meaningful life</a:t>
-            </a:r>
-          </a:p>
-          <a:p>
-            <a:r>
-              <a:rPr lang="en-GB" sz="2400" dirty="0"/>
-              <a:t>It could connect with an app and integrate in calendars for full e2e coverage of planning</a:t>
-            </a:r>
-          </a:p>
-          <a:p>
-            <a:endParaRPr lang="en-GB" sz="2400" dirty="0"/>
-          </a:p>
-          <a:p>
-            <a:r>
-              <a:rPr lang="en-GB" sz="2400" b="1" dirty="0"/>
-              <a:t>In the end, it should be a tool that I enjoy using</a:t>
-            </a:r>
+          <a:bodyPr/>
+          <a:lstStyle/>
+          <a:p>
+            <a:r>
+              <a:rPr lang="en-GB" dirty="0" err="1"/>
+              <a:t>Shortname</a:t>
+            </a:r>
+            <a:endParaRPr lang="en-GB" dirty="0"/>
+          </a:p>
+          <a:p>
+            <a:r>
+              <a:rPr lang="en-GB" dirty="0"/>
+              <a:t>Name</a:t>
+            </a:r>
+          </a:p>
+          <a:p>
+            <a:r>
+              <a:rPr lang="en-GB" dirty="0"/>
+              <a:t>Description</a:t>
+            </a:r>
+          </a:p>
+          <a:p>
+            <a:r>
+              <a:rPr lang="en-GB" dirty="0"/>
+              <a:t>Due-date</a:t>
+            </a:r>
+          </a:p>
+          <a:p>
+            <a:r>
+              <a:rPr lang="en-GB" dirty="0" err="1"/>
+              <a:t>Goal_ID</a:t>
+            </a:r>
+            <a:endParaRPr lang="en-GB" dirty="0"/>
+          </a:p>
+          <a:p>
+            <a:r>
+              <a:rPr lang="en-GB" dirty="0" err="1"/>
+              <a:t>Parent_Task_ID</a:t>
+            </a:r>
+            <a:endParaRPr lang="en-GB" dirty="0"/>
+          </a:p>
+          <a:p>
+            <a:r>
+              <a:rPr lang="en-GB" dirty="0" err="1"/>
+              <a:t>Profile_ID</a:t>
+            </a:r>
+            <a:endParaRPr lang="en-GB" dirty="0"/>
+          </a:p>
+          <a:p>
+            <a:pPr marL="0" indent="0">
+              <a:buNone/>
+            </a:pPr>
+            <a:endParaRPr lang="en-GB" dirty="0"/>
           </a:p>
         </p:txBody>
       </p:sp>
     </p:spTree>
     <p:extLst>
       <p:ext uri="{BB962C8B-B14F-4D97-AF65-F5344CB8AC3E}">
-        <p14:creationId xmlns:p14="http://schemas.microsoft.com/office/powerpoint/2010/main" val="577941651"/>
+        <p14:creationId xmlns:p14="http://schemas.microsoft.com/office/powerpoint/2010/main" val="4068738218"/>
       </p:ext>
     </p:extLst>
   </p:cSld>
@@ -4335,7 +4335,7 @@
 </p:sld>
 </file>
 
-<file path=ppt/slides/slide3.xml><?xml version="1.0" encoding="utf-8"?>
+<file path=ppt/slides/slide2.xml><?xml version="1.0" encoding="utf-8"?>
 <p:sld xmlns:a="http://schemas.openxmlformats.org/drawingml/2006/main" xmlns:r="http://schemas.openxmlformats.org/officeDocument/2006/relationships" xmlns:p="http://schemas.openxmlformats.org/presentationml/2006/main">
   <p:cSld>
     <p:spTree>
@@ -4357,7 +4357,7 @@
           <p:cNvPr id="4" name="Object 3" hidden="1">
             <a:extLst>
               <a:ext uri="{FF2B5EF4-FFF2-40B4-BE49-F238E27FC236}">
-                <a16:creationId xmlns:a16="http://schemas.microsoft.com/office/drawing/2014/main" id="{7A6D06CF-228A-4B4A-921D-B9787AD9671F}"/>
+                <a16:creationId xmlns:a16="http://schemas.microsoft.com/office/drawing/2014/main" id="{A4F420FA-7182-4F8C-A69D-9AB55C3BBB29}"/>
               </a:ext>
             </a:extLst>
           </p:cNvPr>
@@ -4370,7 +4370,7 @@
             </p:custDataLst>
             <p:extLst>
               <p:ext uri="{D42A27DB-BD31-4B8C-83A1-F6EECF244321}">
-                <p14:modId xmlns:p14="http://schemas.microsoft.com/office/powerpoint/2010/main" val="1143617240"/>
+                <p14:modId xmlns:p14="http://schemas.microsoft.com/office/powerpoint/2010/main" val="859402090"/>
               </p:ext>
             </p:extLst>
           </p:nvPr>
@@ -4383,7 +4383,7 @@
           <a:graphicData uri="http://schemas.openxmlformats.org/presentationml/2006/ole">
             <mc:AlternateContent xmlns:mc="http://schemas.openxmlformats.org/markup-compatibility/2006">
               <mc:Choice xmlns:v="urn:schemas-microsoft-com:vml" Requires="v">
-                <p:oleObj spid="_x0000_s4115" name="think-cell Slide" r:id="rId4" imgW="415" imgH="416" progId="TCLayout.ActiveDocument.1">
+                <p:oleObj spid="_x0000_s3093" name="think-cell Slide" r:id="rId4" imgW="415" imgH="416" progId="TCLayout.ActiveDocument.1">
                   <p:embed/>
                 </p:oleObj>
               </mc:Choice>
@@ -4423,7 +4423,7 @@
           <p:cNvPr id="2" name="Title 1">
             <a:extLst>
               <a:ext uri="{FF2B5EF4-FFF2-40B4-BE49-F238E27FC236}">
-                <a16:creationId xmlns:a16="http://schemas.microsoft.com/office/drawing/2014/main" id="{08915DAB-C8A6-436F-ABB3-83E57EDAC8A4}"/>
+                <a16:creationId xmlns:a16="http://schemas.microsoft.com/office/drawing/2014/main" id="{EFA15CA1-7168-4627-A6D4-8CD66543E71B}"/>
               </a:ext>
             </a:extLst>
           </p:cNvPr>
@@ -4441,7 +4441,7 @@
           <a:p>
             <a:r>
               <a:rPr lang="en-GB" dirty="0"/>
-              <a:t>Goals</a:t>
+              <a:t>Vision</a:t>
             </a:r>
           </a:p>
         </p:txBody>
@@ -4451,7 +4451,7 @@
           <p:cNvPr id="3" name="Content Placeholder 2">
             <a:extLst>
               <a:ext uri="{FF2B5EF4-FFF2-40B4-BE49-F238E27FC236}">
-                <a16:creationId xmlns:a16="http://schemas.microsoft.com/office/drawing/2014/main" id="{B60C953E-6BC1-4090-B37A-53B07C701DCB}"/>
+                <a16:creationId xmlns:a16="http://schemas.microsoft.com/office/drawing/2014/main" id="{B75A6FF2-79ED-41E1-8B9E-6D55C4C1655A}"/>
               </a:ext>
             </a:extLst>
           </p:cNvPr>
@@ -4464,23 +4464,55 @@
         </p:nvSpPr>
         <p:spPr/>
         <p:txBody>
-          <a:bodyPr/>
-          <a:lstStyle/>
-          <a:p>
-            <a:r>
-              <a:rPr lang="en-GB" dirty="0"/>
-              <a:t>Create an MVP that I enjoy using, but then also start testing on other people how they enjoy it and get feedback on that through adds etc.</a:t>
-            </a:r>
-          </a:p>
-          <a:p>
-            <a:endParaRPr lang="en-GB" dirty="0"/>
+          <a:bodyPr>
+            <a:normAutofit/>
+          </a:bodyPr>
+          <a:lstStyle/>
+          <a:p>
+            <a:r>
+              <a:rPr lang="en-GB" sz="2400" dirty="0"/>
+              <a:t>Create an application that allows people to create visual plans for their lives </a:t>
+            </a:r>
+          </a:p>
+          <a:p>
+            <a:r>
+              <a:rPr lang="en-GB" sz="2400" dirty="0"/>
+              <a:t>It allows them to create goals, with milestones, results and concrete actions</a:t>
+            </a:r>
+          </a:p>
+          <a:p>
+            <a:r>
+              <a:rPr lang="en-GB" sz="2400" dirty="0"/>
+              <a:t>I helps you think through your life strategically, but with sufficient support to see across goals to prevent tunnel vision </a:t>
+            </a:r>
+          </a:p>
+          <a:p>
+            <a:r>
+              <a:rPr lang="en-GB" sz="2400" dirty="0"/>
+              <a:t>In the end, it should be based on research and should also support people in planning a healthy and meaningful life</a:t>
+            </a:r>
+          </a:p>
+          <a:p>
+            <a:r>
+              <a:rPr lang="en-GB" sz="2400" dirty="0"/>
+              <a:t>It could connect with an app and integrate in calendars for full e2e coverage of planning</a:t>
+            </a:r>
+          </a:p>
+          <a:p>
+            <a:endParaRPr lang="en-GB" sz="2400" dirty="0"/>
+          </a:p>
+          <a:p>
+            <a:r>
+              <a:rPr lang="en-GB" sz="2400" b="1" dirty="0"/>
+              <a:t>In the end, it should be a tool that I enjoy using</a:t>
+            </a:r>
           </a:p>
         </p:txBody>
       </p:sp>
     </p:spTree>
     <p:extLst>
       <p:ext uri="{BB962C8B-B14F-4D97-AF65-F5344CB8AC3E}">
-        <p14:creationId xmlns:p14="http://schemas.microsoft.com/office/powerpoint/2010/main" val="1944937182"/>
+        <p14:creationId xmlns:p14="http://schemas.microsoft.com/office/powerpoint/2010/main" val="577941651"/>
       </p:ext>
     </p:extLst>
   </p:cSld>
@@ -4490,7 +4522,7 @@
 </p:sld>
 </file>
 
-<file path=ppt/slides/slide4.xml><?xml version="1.0" encoding="utf-8"?>
+<file path=ppt/slides/slide3.xml><?xml version="1.0" encoding="utf-8"?>
 <p:sld xmlns:a="http://schemas.openxmlformats.org/drawingml/2006/main" xmlns:r="http://schemas.openxmlformats.org/officeDocument/2006/relationships" xmlns:p="http://schemas.openxmlformats.org/presentationml/2006/main">
   <p:cSld>
     <p:spTree>
@@ -4509,10 +4541,10 @@
       </p:grpSpPr>
       <p:graphicFrame>
         <p:nvGraphicFramePr>
-          <p:cNvPr id="5" name="Object 4" hidden="1">
-            <a:extLst>
-              <a:ext uri="{FF2B5EF4-FFF2-40B4-BE49-F238E27FC236}">
-                <a16:creationId xmlns:a16="http://schemas.microsoft.com/office/drawing/2014/main" id="{8C0E97E7-D1D3-4EE2-A85A-DB6868EFD779}"/>
+          <p:cNvPr id="4" name="Object 3" hidden="1">
+            <a:extLst>
+              <a:ext uri="{FF2B5EF4-FFF2-40B4-BE49-F238E27FC236}">
+                <a16:creationId xmlns:a16="http://schemas.microsoft.com/office/drawing/2014/main" id="{7A6D06CF-228A-4B4A-921D-B9787AD9671F}"/>
               </a:ext>
             </a:extLst>
           </p:cNvPr>
@@ -4525,7 +4557,7 @@
             </p:custDataLst>
             <p:extLst>
               <p:ext uri="{D42A27DB-BD31-4B8C-83A1-F6EECF244321}">
-                <p14:modId xmlns:p14="http://schemas.microsoft.com/office/powerpoint/2010/main" val="2791549682"/>
+                <p14:modId xmlns:p14="http://schemas.microsoft.com/office/powerpoint/2010/main" val="1143617240"/>
               </p:ext>
             </p:extLst>
           </p:nvPr>
@@ -4538,7 +4570,7 @@
           <a:graphicData uri="http://schemas.openxmlformats.org/presentationml/2006/ole">
             <mc:AlternateContent xmlns:mc="http://schemas.openxmlformats.org/markup-compatibility/2006">
               <mc:Choice xmlns:v="urn:schemas-microsoft-com:vml" Requires="v">
-                <p:oleObj spid="_x0000_s5139" name="think-cell Slide" r:id="rId4" imgW="415" imgH="416" progId="TCLayout.ActiveDocument.1">
+                <p:oleObj spid="_x0000_s4117" name="think-cell Slide" r:id="rId4" imgW="415" imgH="416" progId="TCLayout.ActiveDocument.1">
                   <p:embed/>
                 </p:oleObj>
               </mc:Choice>
@@ -4578,7 +4610,7 @@
           <p:cNvPr id="2" name="Title 1">
             <a:extLst>
               <a:ext uri="{FF2B5EF4-FFF2-40B4-BE49-F238E27FC236}">
-                <a16:creationId xmlns:a16="http://schemas.microsoft.com/office/drawing/2014/main" id="{C385C739-FA4D-4930-8144-E421CB0E1AB6}"/>
+                <a16:creationId xmlns:a16="http://schemas.microsoft.com/office/drawing/2014/main" id="{08915DAB-C8A6-436F-ABB3-83E57EDAC8A4}"/>
               </a:ext>
             </a:extLst>
           </p:cNvPr>
@@ -4591,14 +4623,12 @@
         </p:nvSpPr>
         <p:spPr/>
         <p:txBody>
-          <a:bodyPr vert="horz">
-            <a:noAutofit/>
-          </a:bodyPr>
-          <a:lstStyle/>
-          <a:p>
-            <a:r>
-              <a:rPr lang="en-GB" sz="3200" dirty="0"/>
-              <a:t>Create an MVP that I enjoy using, but then also start testing on other people how they enjoy it and get feedback</a:t>
+          <a:bodyPr vert="horz"/>
+          <a:lstStyle/>
+          <a:p>
+            <a:r>
+              <a:rPr lang="en-GB" dirty="0"/>
+              <a:t>Goals</a:t>
             </a:r>
           </a:p>
         </p:txBody>
@@ -4608,7 +4638,7 @@
           <p:cNvPr id="3" name="Content Placeholder 2">
             <a:extLst>
               <a:ext uri="{FF2B5EF4-FFF2-40B4-BE49-F238E27FC236}">
-                <a16:creationId xmlns:a16="http://schemas.microsoft.com/office/drawing/2014/main" id="{EA1AD017-6521-4E2E-88E3-73717DC3EA1B}"/>
+                <a16:creationId xmlns:a16="http://schemas.microsoft.com/office/drawing/2014/main" id="{B60C953E-6BC1-4090-B37A-53B07C701DCB}"/>
               </a:ext>
             </a:extLst>
           </p:cNvPr>
@@ -4624,56 +4654,20 @@
           <a:bodyPr/>
           <a:lstStyle/>
           <a:p>
-            <a:pPr marL="0" indent="0">
-              <a:buNone/>
-            </a:pPr>
             <a:r>
               <a:rPr lang="en-GB" dirty="0"/>
-              <a:t>What should be in this MVP</a:t>
-            </a:r>
-          </a:p>
-          <a:p>
-            <a:r>
-              <a:rPr lang="en-GB" dirty="0"/>
-              <a:t>Imagine what your life could be like in ~3 years</a:t>
-            </a:r>
-          </a:p>
-          <a:p>
-            <a:r>
-              <a:rPr lang="en-GB" dirty="0"/>
-              <a:t>Lay down high-level goals across topics</a:t>
-            </a:r>
-          </a:p>
-          <a:p>
-            <a:r>
-              <a:rPr lang="en-GB" dirty="0"/>
-              <a:t>Determine what you could do in your first month to move closer to that goal </a:t>
-            </a:r>
-          </a:p>
-          <a:p>
-            <a:r>
-              <a:rPr lang="en-GB" dirty="0"/>
-              <a:t>Then start planning for the three years in total </a:t>
+              <a:t>Create an MVP that I enjoy using, but then also start testing on other people how they enjoy it and get feedback on that through adds etc.</a:t>
             </a:r>
           </a:p>
           <a:p>
             <a:endParaRPr lang="en-GB" dirty="0"/>
-          </a:p>
-          <a:p>
-            <a:pPr marL="0" indent="0">
-              <a:buNone/>
-            </a:pPr>
-            <a:r>
-              <a:rPr lang="en-GB" b="1" dirty="0"/>
-              <a:t>Goal: Make it customizable but not tedious </a:t>
-            </a:r>
           </a:p>
         </p:txBody>
       </p:sp>
     </p:spTree>
     <p:extLst>
       <p:ext uri="{BB962C8B-B14F-4D97-AF65-F5344CB8AC3E}">
-        <p14:creationId xmlns:p14="http://schemas.microsoft.com/office/powerpoint/2010/main" val="3699841496"/>
+        <p14:creationId xmlns:p14="http://schemas.microsoft.com/office/powerpoint/2010/main" val="1944937182"/>
       </p:ext>
     </p:extLst>
   </p:cSld>
@@ -4683,7 +4677,7 @@
 </p:sld>
 </file>
 
-<file path=ppt/slides/slide5.xml><?xml version="1.0" encoding="utf-8"?>
+<file path=ppt/slides/slide4.xml><?xml version="1.0" encoding="utf-8"?>
 <p:sld xmlns:a="http://schemas.openxmlformats.org/drawingml/2006/main" xmlns:r="http://schemas.openxmlformats.org/officeDocument/2006/relationships" xmlns:p="http://schemas.openxmlformats.org/presentationml/2006/main">
   <p:cSld>
     <p:spTree>
@@ -4705,7 +4699,7 @@
           <p:cNvPr id="5" name="Object 4" hidden="1">
             <a:extLst>
               <a:ext uri="{FF2B5EF4-FFF2-40B4-BE49-F238E27FC236}">
-                <a16:creationId xmlns:a16="http://schemas.microsoft.com/office/drawing/2014/main" id="{C65C8C43-8FDA-479C-8CF8-FFAF9F0C0036}"/>
+                <a16:creationId xmlns:a16="http://schemas.microsoft.com/office/drawing/2014/main" id="{8C0E97E7-D1D3-4EE2-A85A-DB6868EFD779}"/>
               </a:ext>
             </a:extLst>
           </p:cNvPr>
@@ -4718,7 +4712,7 @@
             </p:custDataLst>
             <p:extLst>
               <p:ext uri="{D42A27DB-BD31-4B8C-83A1-F6EECF244321}">
-                <p14:modId xmlns:p14="http://schemas.microsoft.com/office/powerpoint/2010/main" val="903690597"/>
+                <p14:modId xmlns:p14="http://schemas.microsoft.com/office/powerpoint/2010/main" val="2791549682"/>
               </p:ext>
             </p:extLst>
           </p:nvPr>
@@ -4731,7 +4725,7 @@
           <a:graphicData uri="http://schemas.openxmlformats.org/presentationml/2006/ole">
             <mc:AlternateContent xmlns:mc="http://schemas.openxmlformats.org/markup-compatibility/2006">
               <mc:Choice xmlns:v="urn:schemas-microsoft-com:vml" Requires="v">
-                <p:oleObj spid="_x0000_s6161" name="think-cell Slide" r:id="rId4" imgW="415" imgH="416" progId="TCLayout.ActiveDocument.1">
+                <p:oleObj spid="_x0000_s5141" name="think-cell Slide" r:id="rId4" imgW="415" imgH="416" progId="TCLayout.ActiveDocument.1">
                   <p:embed/>
                 </p:oleObj>
               </mc:Choice>
@@ -4771,7 +4765,7 @@
           <p:cNvPr id="2" name="Title 1">
             <a:extLst>
               <a:ext uri="{FF2B5EF4-FFF2-40B4-BE49-F238E27FC236}">
-                <a16:creationId xmlns:a16="http://schemas.microsoft.com/office/drawing/2014/main" id="{B63E190E-5E27-4A01-82CB-A43C0C7B7D4C}"/>
+                <a16:creationId xmlns:a16="http://schemas.microsoft.com/office/drawing/2014/main" id="{C385C739-FA4D-4930-8144-E421CB0E1AB6}"/>
               </a:ext>
             </a:extLst>
           </p:cNvPr>
@@ -4784,90 +4778,89 @@
         </p:nvSpPr>
         <p:spPr/>
         <p:txBody>
-          <a:bodyPr vert="horz"/>
-          <a:lstStyle/>
-          <a:p>
+          <a:bodyPr vert="horz">
+            <a:noAutofit/>
+          </a:bodyPr>
+          <a:lstStyle/>
+          <a:p>
+            <a:r>
+              <a:rPr lang="en-GB" sz="3200" dirty="0"/>
+              <a:t>Create an MVP that I enjoy using, but then also start testing on other people how they enjoy it and get feedback</a:t>
+            </a:r>
+          </a:p>
+        </p:txBody>
+      </p:sp>
+      <p:sp>
+        <p:nvSpPr>
+          <p:cNvPr id="3" name="Content Placeholder 2">
+            <a:extLst>
+              <a:ext uri="{FF2B5EF4-FFF2-40B4-BE49-F238E27FC236}">
+                <a16:creationId xmlns:a16="http://schemas.microsoft.com/office/drawing/2014/main" id="{EA1AD017-6521-4E2E-88E3-73717DC3EA1B}"/>
+              </a:ext>
+            </a:extLst>
+          </p:cNvPr>
+          <p:cNvSpPr>
+            <a:spLocks noGrp="1"/>
+          </p:cNvSpPr>
+          <p:nvPr>
+            <p:ph idx="1"/>
+          </p:nvPr>
+        </p:nvSpPr>
+        <p:spPr/>
+        <p:txBody>
+          <a:bodyPr/>
+          <a:lstStyle/>
+          <a:p>
+            <a:pPr marL="0" indent="0">
+              <a:buNone/>
+            </a:pPr>
             <a:r>
               <a:rPr lang="en-GB" dirty="0"/>
-              <a:t>Pages to be created</a:t>
-            </a:r>
-          </a:p>
-        </p:txBody>
-      </p:sp>
-      <p:sp>
-        <p:nvSpPr>
-          <p:cNvPr id="3" name="Content Placeholder 2">
-            <a:extLst>
-              <a:ext uri="{FF2B5EF4-FFF2-40B4-BE49-F238E27FC236}">
-                <a16:creationId xmlns:a16="http://schemas.microsoft.com/office/drawing/2014/main" id="{729B03DA-51D7-4D9D-9C5B-2819F73F4639}"/>
-              </a:ext>
-            </a:extLst>
-          </p:cNvPr>
-          <p:cNvSpPr>
-            <a:spLocks noGrp="1"/>
-          </p:cNvSpPr>
-          <p:nvPr>
-            <p:ph idx="1"/>
-          </p:nvPr>
-        </p:nvSpPr>
-        <p:spPr/>
-        <p:txBody>
-          <a:bodyPr/>
-          <a:lstStyle/>
+              <a:t>What should be in this MVP</a:t>
+            </a:r>
+          </a:p>
+          <a:p>
+            <a:r>
+              <a:rPr lang="en-GB" dirty="0"/>
+              <a:t>Imagine what your life could be like in ~3 years</a:t>
+            </a:r>
+          </a:p>
+          <a:p>
+            <a:r>
+              <a:rPr lang="en-GB" dirty="0"/>
+              <a:t>Lay down high-level goals across topics</a:t>
+            </a:r>
+          </a:p>
+          <a:p>
+            <a:r>
+              <a:rPr lang="en-GB" dirty="0"/>
+              <a:t>Determine what you could do in your first month to move closer to that goal </a:t>
+            </a:r>
+          </a:p>
+          <a:p>
+            <a:r>
+              <a:rPr lang="en-GB" dirty="0"/>
+              <a:t>Then start planning for the three years in total </a:t>
+            </a:r>
+          </a:p>
+          <a:p>
+            <a:endParaRPr lang="en-GB" dirty="0"/>
+          </a:p>
           <a:p>
             <a:pPr marL="0" indent="0">
               <a:buNone/>
             </a:pPr>
             <a:r>
-              <a:rPr lang="en-GB" dirty="0"/>
-              <a:t>Web-app</a:t>
-            </a:r>
-          </a:p>
-          <a:p>
-            <a:r>
-              <a:rPr lang="en-GB" dirty="0"/>
-              <a:t>Registration and onboarding</a:t>
-            </a:r>
-          </a:p>
-          <a:p>
-            <a:r>
-              <a:rPr lang="en-GB" dirty="0"/>
-              <a:t>Overview page </a:t>
-            </a:r>
-          </a:p>
-          <a:p>
-            <a:r>
-              <a:rPr lang="en-GB" dirty="0"/>
-              <a:t>Categorizations, goals, milestones and tasks visualization</a:t>
-            </a:r>
-          </a:p>
-          <a:p>
-            <a:r>
-              <a:rPr lang="en-GB" dirty="0"/>
-              <a:t>Checkbox/journaling option</a:t>
-            </a:r>
-          </a:p>
-          <a:p>
-            <a:r>
-              <a:rPr lang="en-GB" dirty="0"/>
-              <a:t>Habits tracker?</a:t>
-            </a:r>
-          </a:p>
-          <a:p>
-            <a:pPr marL="0" indent="0">
-              <a:buNone/>
-            </a:pPr>
-            <a:endParaRPr lang="en-GB" dirty="0"/>
-          </a:p>
-          <a:p>
-            <a:endParaRPr lang="en-GB" dirty="0"/>
+              <a:rPr lang="en-GB" b="1" dirty="0"/>
+              <a:t>Goal: Make it customizable but not tedious </a:t>
+            </a:r>
           </a:p>
         </p:txBody>
       </p:sp>
     </p:spTree>
     <p:extLst>
       <p:ext uri="{BB962C8B-B14F-4D97-AF65-F5344CB8AC3E}">
-        <p14:creationId xmlns:p14="http://schemas.microsoft.com/office/powerpoint/2010/main" val="1613302054"/>
+        <p14:creationId xmlns:p14="http://schemas.microsoft.com/office/powerpoint/2010/main" val="3699841496"/>
       </p:ext>
     </p:extLst>
   </p:cSld>
@@ -4877,7 +4870,7 @@
 </p:sld>
 </file>
 
-<file path=ppt/slides/slide6.xml><?xml version="1.0" encoding="utf-8"?>
+<file path=ppt/slides/slide5.xml><?xml version="1.0" encoding="utf-8"?>
 <p:sld xmlns:a="http://schemas.openxmlformats.org/drawingml/2006/main" xmlns:r="http://schemas.openxmlformats.org/officeDocument/2006/relationships" xmlns:p="http://schemas.openxmlformats.org/presentationml/2006/main">
   <p:cSld>
     <p:spTree>
@@ -4896,10 +4889,10 @@
       </p:grpSpPr>
       <p:graphicFrame>
         <p:nvGraphicFramePr>
-          <p:cNvPr id="6" name="Object 5" hidden="1">
-            <a:extLst>
-              <a:ext uri="{FF2B5EF4-FFF2-40B4-BE49-F238E27FC236}">
-                <a16:creationId xmlns:a16="http://schemas.microsoft.com/office/drawing/2014/main" id="{F969EA14-469C-4033-AABD-1231A77D67D1}"/>
+          <p:cNvPr id="5" name="Object 4" hidden="1">
+            <a:extLst>
+              <a:ext uri="{FF2B5EF4-FFF2-40B4-BE49-F238E27FC236}">
+                <a16:creationId xmlns:a16="http://schemas.microsoft.com/office/drawing/2014/main" id="{C65C8C43-8FDA-479C-8CF8-FFAF9F0C0036}"/>
               </a:ext>
             </a:extLst>
           </p:cNvPr>
@@ -4912,7 +4905,7 @@
             </p:custDataLst>
             <p:extLst>
               <p:ext uri="{D42A27DB-BD31-4B8C-83A1-F6EECF244321}">
-                <p14:modId xmlns:p14="http://schemas.microsoft.com/office/powerpoint/2010/main" val="4246974446"/>
+                <p14:modId xmlns:p14="http://schemas.microsoft.com/office/powerpoint/2010/main" val="903690597"/>
               </p:ext>
             </p:extLst>
           </p:nvPr>
@@ -4925,7 +4918,7 @@
           <a:graphicData uri="http://schemas.openxmlformats.org/presentationml/2006/ole">
             <mc:AlternateContent xmlns:mc="http://schemas.openxmlformats.org/markup-compatibility/2006">
               <mc:Choice xmlns:v="urn:schemas-microsoft-com:vml" Requires="v">
-                <p:oleObj spid="_x0000_s7176" name="think-cell Slide" r:id="rId4" imgW="415" imgH="416" progId="TCLayout.ActiveDocument.1">
+                <p:oleObj spid="_x0000_s6163" name="think-cell Slide" r:id="rId4" imgW="415" imgH="416" progId="TCLayout.ActiveDocument.1">
                   <p:embed/>
                 </p:oleObj>
               </mc:Choice>
@@ -4962,10 +4955,10 @@
       </p:graphicFrame>
       <p:sp>
         <p:nvSpPr>
-          <p:cNvPr id="4" name="Title 3">
-            <a:extLst>
-              <a:ext uri="{FF2B5EF4-FFF2-40B4-BE49-F238E27FC236}">
-                <a16:creationId xmlns:a16="http://schemas.microsoft.com/office/drawing/2014/main" id="{1A4F018F-4887-46F1-ADD1-481D9C71D1A4}"/>
+          <p:cNvPr id="2" name="Title 1">
+            <a:extLst>
+              <a:ext uri="{FF2B5EF4-FFF2-40B4-BE49-F238E27FC236}">
+                <a16:creationId xmlns:a16="http://schemas.microsoft.com/office/drawing/2014/main" id="{B63E190E-5E27-4A01-82CB-A43C0C7B7D4C}"/>
               </a:ext>
             </a:extLst>
           </p:cNvPr>
@@ -4983,25 +4976,25 @@
           <a:p>
             <a:r>
               <a:rPr lang="en-GB" dirty="0"/>
-              <a:t>Models</a:t>
-            </a:r>
-          </a:p>
-        </p:txBody>
-      </p:sp>
-      <p:sp>
-        <p:nvSpPr>
-          <p:cNvPr id="5" name="Text Placeholder 4">
-            <a:extLst>
-              <a:ext uri="{FF2B5EF4-FFF2-40B4-BE49-F238E27FC236}">
-                <a16:creationId xmlns:a16="http://schemas.microsoft.com/office/drawing/2014/main" id="{B1051219-7D34-43EB-8D50-2CD424571630}"/>
-              </a:ext>
-            </a:extLst>
-          </p:cNvPr>
-          <p:cNvSpPr>
-            <a:spLocks noGrp="1"/>
-          </p:cNvSpPr>
-          <p:nvPr>
-            <p:ph type="body" idx="1"/>
+              <a:t>Pages to be created</a:t>
+            </a:r>
+          </a:p>
+        </p:txBody>
+      </p:sp>
+      <p:sp>
+        <p:nvSpPr>
+          <p:cNvPr id="3" name="Content Placeholder 2">
+            <a:extLst>
+              <a:ext uri="{FF2B5EF4-FFF2-40B4-BE49-F238E27FC236}">
+                <a16:creationId xmlns:a16="http://schemas.microsoft.com/office/drawing/2014/main" id="{729B03DA-51D7-4D9D-9C5B-2819F73F4639}"/>
+              </a:ext>
+            </a:extLst>
+          </p:cNvPr>
+          <p:cNvSpPr>
+            <a:spLocks noGrp="1"/>
+          </p:cNvSpPr>
+          <p:nvPr>
+            <p:ph idx="1"/>
           </p:nvPr>
         </p:nvSpPr>
         <p:spPr/>
@@ -5009,14 +5002,59 @@
           <a:bodyPr/>
           <a:lstStyle/>
           <a:p>
-            <a:endParaRPr lang="en-GB"/>
+            <a:pPr marL="0" indent="0">
+              <a:buNone/>
+            </a:pPr>
+            <a:r>
+              <a:rPr lang="en-GB" dirty="0"/>
+              <a:t>Web-app</a:t>
+            </a:r>
+          </a:p>
+          <a:p>
+            <a:r>
+              <a:rPr lang="en-GB" dirty="0"/>
+              <a:t>Registration and onboarding</a:t>
+            </a:r>
+          </a:p>
+          <a:p>
+            <a:r>
+              <a:rPr lang="en-GB" dirty="0"/>
+              <a:t>Overview page </a:t>
+            </a:r>
+          </a:p>
+          <a:p>
+            <a:r>
+              <a:rPr lang="en-GB" dirty="0"/>
+              <a:t>Categorizations, goals, milestones and tasks visualization</a:t>
+            </a:r>
+          </a:p>
+          <a:p>
+            <a:r>
+              <a:rPr lang="en-GB" dirty="0"/>
+              <a:t>Checkbox/journaling option</a:t>
+            </a:r>
+          </a:p>
+          <a:p>
+            <a:r>
+              <a:rPr lang="en-GB" dirty="0"/>
+              <a:t>Habits tracker?</a:t>
+            </a:r>
+          </a:p>
+          <a:p>
+            <a:pPr marL="0" indent="0">
+              <a:buNone/>
+            </a:pPr>
+            <a:endParaRPr lang="en-GB" dirty="0"/>
+          </a:p>
+          <a:p>
+            <a:endParaRPr lang="en-GB" dirty="0"/>
           </a:p>
         </p:txBody>
       </p:sp>
     </p:spTree>
     <p:extLst>
       <p:ext uri="{BB962C8B-B14F-4D97-AF65-F5344CB8AC3E}">
-        <p14:creationId xmlns:p14="http://schemas.microsoft.com/office/powerpoint/2010/main" val="389683405"/>
+        <p14:creationId xmlns:p14="http://schemas.microsoft.com/office/powerpoint/2010/main" val="1613302054"/>
       </p:ext>
     </p:extLst>
   </p:cSld>
@@ -5026,7 +5064,7 @@
 </p:sld>
 </file>
 
-<file path=ppt/slides/slide7.xml><?xml version="1.0" encoding="utf-8"?>
+<file path=ppt/slides/slide6.xml><?xml version="1.0" encoding="utf-8"?>
 <p:sld xmlns:a="http://schemas.openxmlformats.org/drawingml/2006/main" xmlns:r="http://schemas.openxmlformats.org/officeDocument/2006/relationships" xmlns:p="http://schemas.openxmlformats.org/presentationml/2006/main">
   <p:cSld>
     <p:spTree>
@@ -5048,7 +5086,7 @@
           <p:cNvPr id="6" name="Object 5" hidden="1">
             <a:extLst>
               <a:ext uri="{FF2B5EF4-FFF2-40B4-BE49-F238E27FC236}">
-                <a16:creationId xmlns:a16="http://schemas.microsoft.com/office/drawing/2014/main" id="{D09A209B-E87C-463F-967F-DBD3959A8C57}"/>
+                <a16:creationId xmlns:a16="http://schemas.microsoft.com/office/drawing/2014/main" id="{F969EA14-469C-4033-AABD-1231A77D67D1}"/>
               </a:ext>
             </a:extLst>
           </p:cNvPr>
@@ -5061,7 +5099,7 @@
             </p:custDataLst>
             <p:extLst>
               <p:ext uri="{D42A27DB-BD31-4B8C-83A1-F6EECF244321}">
-                <p14:modId xmlns:p14="http://schemas.microsoft.com/office/powerpoint/2010/main" val="1338379272"/>
+                <p14:modId xmlns:p14="http://schemas.microsoft.com/office/powerpoint/2010/main" val="4246974446"/>
               </p:ext>
             </p:extLst>
           </p:nvPr>
@@ -5074,7 +5112,7 @@
           <a:graphicData uri="http://schemas.openxmlformats.org/presentationml/2006/ole">
             <mc:AlternateContent xmlns:mc="http://schemas.openxmlformats.org/markup-compatibility/2006">
               <mc:Choice xmlns:v="urn:schemas-microsoft-com:vml" Requires="v">
-                <p:oleObj spid="_x0000_s8200" name="think-cell Slide" r:id="rId4" imgW="415" imgH="416" progId="TCLayout.ActiveDocument.1">
+                <p:oleObj spid="_x0000_s7178" name="think-cell Slide" r:id="rId4" imgW="415" imgH="416" progId="TCLayout.ActiveDocument.1">
                   <p:embed/>
                 </p:oleObj>
               </mc:Choice>
@@ -5114,7 +5152,7 @@
           <p:cNvPr id="4" name="Title 3">
             <a:extLst>
               <a:ext uri="{FF2B5EF4-FFF2-40B4-BE49-F238E27FC236}">
-                <a16:creationId xmlns:a16="http://schemas.microsoft.com/office/drawing/2014/main" id="{C8CFF5F8-CBA7-4F58-8A36-CC8F826BA8ED}"/>
+                <a16:creationId xmlns:a16="http://schemas.microsoft.com/office/drawing/2014/main" id="{1A4F018F-4887-46F1-ADD1-481D9C71D1A4}"/>
               </a:ext>
             </a:extLst>
           </p:cNvPr>
@@ -5132,25 +5170,25 @@
           <a:p>
             <a:r>
               <a:rPr lang="en-GB" dirty="0"/>
-              <a:t>Profile</a:t>
-            </a:r>
-          </a:p>
-        </p:txBody>
-      </p:sp>
-      <p:sp>
-        <p:nvSpPr>
-          <p:cNvPr id="5" name="Content Placeholder 4">
-            <a:extLst>
-              <a:ext uri="{FF2B5EF4-FFF2-40B4-BE49-F238E27FC236}">
-                <a16:creationId xmlns:a16="http://schemas.microsoft.com/office/drawing/2014/main" id="{E93B38C2-FCFB-45E1-BE31-88CC2FA69C1E}"/>
-              </a:ext>
-            </a:extLst>
-          </p:cNvPr>
-          <p:cNvSpPr>
-            <a:spLocks noGrp="1"/>
-          </p:cNvSpPr>
-          <p:nvPr>
-            <p:ph idx="1"/>
+              <a:t>Models</a:t>
+            </a:r>
+          </a:p>
+        </p:txBody>
+      </p:sp>
+      <p:sp>
+        <p:nvSpPr>
+          <p:cNvPr id="5" name="Text Placeholder 4">
+            <a:extLst>
+              <a:ext uri="{FF2B5EF4-FFF2-40B4-BE49-F238E27FC236}">
+                <a16:creationId xmlns:a16="http://schemas.microsoft.com/office/drawing/2014/main" id="{B1051219-7D34-43EB-8D50-2CD424571630}"/>
+              </a:ext>
+            </a:extLst>
+          </p:cNvPr>
+          <p:cNvSpPr>
+            <a:spLocks noGrp="1"/>
+          </p:cNvSpPr>
+          <p:nvPr>
+            <p:ph type="body" idx="1"/>
           </p:nvPr>
         </p:nvSpPr>
         <p:spPr/>
@@ -5158,46 +5196,178 @@
           <a:bodyPr/>
           <a:lstStyle/>
           <a:p>
-            <a:r>
-              <a:rPr lang="en-GB" dirty="0" err="1"/>
-              <a:t>Firstname</a:t>
-            </a:r>
-            <a:endParaRPr lang="en-GB" dirty="0"/>
-          </a:p>
-          <a:p>
-            <a:r>
-              <a:rPr lang="en-GB" dirty="0" err="1"/>
-              <a:t>Lastname</a:t>
-            </a:r>
-            <a:r>
-              <a:rPr lang="en-GB" dirty="0"/>
-              <a:t> </a:t>
-            </a:r>
-          </a:p>
-          <a:p>
-            <a:r>
-              <a:rPr lang="en-GB" dirty="0"/>
-              <a:t>Email </a:t>
-            </a:r>
-          </a:p>
-          <a:p>
-            <a:r>
-              <a:rPr lang="en-GB" dirty="0"/>
-              <a:t>Password</a:t>
-            </a:r>
-          </a:p>
-          <a:p>
-            <a:r>
-              <a:rPr lang="en-GB" dirty="0"/>
-              <a:t>Age</a:t>
-            </a:r>
+            <a:endParaRPr lang="en-GB"/>
           </a:p>
         </p:txBody>
       </p:sp>
     </p:spTree>
     <p:extLst>
       <p:ext uri="{BB962C8B-B14F-4D97-AF65-F5344CB8AC3E}">
-        <p14:creationId xmlns:p14="http://schemas.microsoft.com/office/powerpoint/2010/main" val="3368136810"/>
+        <p14:creationId xmlns:p14="http://schemas.microsoft.com/office/powerpoint/2010/main" val="389683405"/>
+      </p:ext>
+    </p:extLst>
+  </p:cSld>
+  <p:clrMapOvr>
+    <a:masterClrMapping/>
+  </p:clrMapOvr>
+</p:sld>
+</file>
+
+<file path=ppt/slides/slide7.xml><?xml version="1.0" encoding="utf-8"?>
+<p:sld xmlns:a="http://schemas.openxmlformats.org/drawingml/2006/main" xmlns:r="http://schemas.openxmlformats.org/officeDocument/2006/relationships" xmlns:p="http://schemas.openxmlformats.org/presentationml/2006/main">
+  <p:cSld>
+    <p:spTree>
+      <p:nvGrpSpPr>
+        <p:cNvPr id="1" name=""/>
+        <p:cNvGrpSpPr/>
+        <p:nvPr/>
+      </p:nvGrpSpPr>
+      <p:grpSpPr>
+        <a:xfrm>
+          <a:off x="0" y="0"/>
+          <a:ext cx="0" cy="0"/>
+          <a:chOff x="0" y="0"/>
+          <a:chExt cx="0" cy="0"/>
+        </a:xfrm>
+      </p:grpSpPr>
+      <p:graphicFrame>
+        <p:nvGraphicFramePr>
+          <p:cNvPr id="6" name="Object 5" hidden="1">
+            <a:extLst>
+              <a:ext uri="{FF2B5EF4-FFF2-40B4-BE49-F238E27FC236}">
+                <a16:creationId xmlns:a16="http://schemas.microsoft.com/office/drawing/2014/main" id="{D09A209B-E87C-463F-967F-DBD3959A8C57}"/>
+              </a:ext>
+            </a:extLst>
+          </p:cNvPr>
+          <p:cNvGraphicFramePr>
+            <a:graphicFrameLocks noChangeAspect="1"/>
+          </p:cNvGraphicFramePr>
+          <p:nvPr>
+            <p:custDataLst>
+              <p:tags r:id="rId2"/>
+            </p:custDataLst>
+            <p:extLst>
+              <p:ext uri="{D42A27DB-BD31-4B8C-83A1-F6EECF244321}">
+                <p14:modId xmlns:p14="http://schemas.microsoft.com/office/powerpoint/2010/main" val="2125348958"/>
+              </p:ext>
+            </p:extLst>
+          </p:nvPr>
+        </p:nvGraphicFramePr>
+        <p:xfrm>
+          <a:off x="1588" y="1588"/>
+          <a:ext cx="1588" cy="1588"/>
+        </p:xfrm>
+        <a:graphic>
+          <a:graphicData uri="http://schemas.openxmlformats.org/presentationml/2006/ole">
+            <mc:AlternateContent xmlns:mc="http://schemas.openxmlformats.org/markup-compatibility/2006">
+              <mc:Choice xmlns:v="urn:schemas-microsoft-com:vml" Requires="v">
+                <p:oleObj spid="_x0000_s14338" name="think-cell Slide" r:id="rId4" imgW="415" imgH="416" progId="TCLayout.ActiveDocument.1">
+                  <p:embed/>
+                </p:oleObj>
+              </mc:Choice>
+              <mc:Fallback>
+                <p:oleObj name="think-cell Slide" r:id="rId4" imgW="415" imgH="416" progId="TCLayout.ActiveDocument.1">
+                  <p:embed/>
+                  <p:pic>
+                    <p:nvPicPr>
+                      <p:cNvPr id="6" name="Object 5" hidden="1">
+                        <a:extLst>
+                          <a:ext uri="{FF2B5EF4-FFF2-40B4-BE49-F238E27FC236}">
+                            <a16:creationId xmlns:a16="http://schemas.microsoft.com/office/drawing/2014/main" id="{D09A209B-E87C-463F-967F-DBD3959A8C57}"/>
+                          </a:ext>
+                        </a:extLst>
+                      </p:cNvPr>
+                      <p:cNvPicPr/>
+                      <p:nvPr/>
+                    </p:nvPicPr>
+                    <p:blipFill>
+                      <a:blip r:embed="rId5"/>
+                      <a:stretch>
+                        <a:fillRect/>
+                      </a:stretch>
+                    </p:blipFill>
+                    <p:spPr>
+                      <a:xfrm>
+                        <a:off x="1588" y="1588"/>
+                        <a:ext cx="1588" cy="1588"/>
+                      </a:xfrm>
+                      <a:prstGeom prst="rect">
+                        <a:avLst/>
+                      </a:prstGeom>
+                    </p:spPr>
+                  </p:pic>
+                </p:oleObj>
+              </mc:Fallback>
+            </mc:AlternateContent>
+          </a:graphicData>
+        </a:graphic>
+      </p:graphicFrame>
+      <p:sp>
+        <p:nvSpPr>
+          <p:cNvPr id="4" name="Title 3">
+            <a:extLst>
+              <a:ext uri="{FF2B5EF4-FFF2-40B4-BE49-F238E27FC236}">
+                <a16:creationId xmlns:a16="http://schemas.microsoft.com/office/drawing/2014/main" id="{C8CFF5F8-CBA7-4F58-8A36-CC8F826BA8ED}"/>
+              </a:ext>
+            </a:extLst>
+          </p:cNvPr>
+          <p:cNvSpPr>
+            <a:spLocks noGrp="1"/>
+          </p:cNvSpPr>
+          <p:nvPr>
+            <p:ph type="title"/>
+          </p:nvPr>
+        </p:nvSpPr>
+        <p:spPr/>
+        <p:txBody>
+          <a:bodyPr vert="horz"/>
+          <a:lstStyle/>
+          <a:p>
+            <a:r>
+              <a:rPr lang="en-GB" dirty="0"/>
+              <a:t>User</a:t>
+            </a:r>
+          </a:p>
+        </p:txBody>
+      </p:sp>
+      <p:sp>
+        <p:nvSpPr>
+          <p:cNvPr id="5" name="Content Placeholder 4">
+            <a:extLst>
+              <a:ext uri="{FF2B5EF4-FFF2-40B4-BE49-F238E27FC236}">
+                <a16:creationId xmlns:a16="http://schemas.microsoft.com/office/drawing/2014/main" id="{E93B38C2-FCFB-45E1-BE31-88CC2FA69C1E}"/>
+              </a:ext>
+            </a:extLst>
+          </p:cNvPr>
+          <p:cNvSpPr>
+            <a:spLocks noGrp="1"/>
+          </p:cNvSpPr>
+          <p:nvPr>
+            <p:ph idx="1"/>
+          </p:nvPr>
+        </p:nvSpPr>
+        <p:spPr/>
+        <p:txBody>
+          <a:bodyPr/>
+          <a:lstStyle/>
+          <a:p>
+            <a:r>
+              <a:rPr lang="en-GB" dirty="0"/>
+              <a:t>Email </a:t>
+            </a:r>
+          </a:p>
+          <a:p>
+            <a:r>
+              <a:rPr lang="en-GB" dirty="0"/>
+              <a:t>Password</a:t>
+            </a:r>
+          </a:p>
+        </p:txBody>
+      </p:sp>
+    </p:spTree>
+    <p:extLst>
+      <p:ext uri="{BB962C8B-B14F-4D97-AF65-F5344CB8AC3E}">
+        <p14:creationId xmlns:p14="http://schemas.microsoft.com/office/powerpoint/2010/main" val="3667249431"/>
       </p:ext>
     </p:extLst>
   </p:cSld>
@@ -5226,10 +5396,10 @@
       </p:grpSpPr>
       <p:graphicFrame>
         <p:nvGraphicFramePr>
-          <p:cNvPr id="4" name="Object 3" hidden="1">
-            <a:extLst>
-              <a:ext uri="{FF2B5EF4-FFF2-40B4-BE49-F238E27FC236}">
-                <a16:creationId xmlns:a16="http://schemas.microsoft.com/office/drawing/2014/main" id="{89138ECF-FAC1-4D67-BE04-02A1B8A4FED4}"/>
+          <p:cNvPr id="6" name="Object 5" hidden="1">
+            <a:extLst>
+              <a:ext uri="{FF2B5EF4-FFF2-40B4-BE49-F238E27FC236}">
+                <a16:creationId xmlns:a16="http://schemas.microsoft.com/office/drawing/2014/main" id="{D09A209B-E87C-463F-967F-DBD3959A8C57}"/>
               </a:ext>
             </a:extLst>
           </p:cNvPr>
@@ -5242,7 +5412,7 @@
             </p:custDataLst>
             <p:extLst>
               <p:ext uri="{D42A27DB-BD31-4B8C-83A1-F6EECF244321}">
-                <p14:modId xmlns:p14="http://schemas.microsoft.com/office/powerpoint/2010/main" val="3428019457"/>
+                <p14:modId xmlns:p14="http://schemas.microsoft.com/office/powerpoint/2010/main" val="1338379272"/>
               </p:ext>
             </p:extLst>
           </p:nvPr>
@@ -5255,7 +5425,7 @@
           <a:graphicData uri="http://schemas.openxmlformats.org/presentationml/2006/ole">
             <mc:AlternateContent xmlns:mc="http://schemas.openxmlformats.org/markup-compatibility/2006">
               <mc:Choice xmlns:v="urn:schemas-microsoft-com:vml" Requires="v">
-                <p:oleObj spid="_x0000_s9224" name="think-cell Slide" r:id="rId4" imgW="415" imgH="416" progId="TCLayout.ActiveDocument.1">
+                <p:oleObj spid="_x0000_s8202" name="think-cell Slide" r:id="rId4" imgW="415" imgH="416" progId="TCLayout.ActiveDocument.1">
                   <p:embed/>
                 </p:oleObj>
               </mc:Choice>
@@ -5292,10 +5462,10 @@
       </p:graphicFrame>
       <p:sp>
         <p:nvSpPr>
-          <p:cNvPr id="2" name="Title 1">
-            <a:extLst>
-              <a:ext uri="{FF2B5EF4-FFF2-40B4-BE49-F238E27FC236}">
-                <a16:creationId xmlns:a16="http://schemas.microsoft.com/office/drawing/2014/main" id="{F26FBC1D-F191-4FAB-B578-BD4E00608B26}"/>
+          <p:cNvPr id="4" name="Title 3">
+            <a:extLst>
+              <a:ext uri="{FF2B5EF4-FFF2-40B4-BE49-F238E27FC236}">
+                <a16:creationId xmlns:a16="http://schemas.microsoft.com/office/drawing/2014/main" id="{C8CFF5F8-CBA7-4F58-8A36-CC8F826BA8ED}"/>
               </a:ext>
             </a:extLst>
           </p:cNvPr>
@@ -5313,17 +5483,17 @@
           <a:p>
             <a:r>
               <a:rPr lang="en-GB" dirty="0"/>
-              <a:t>Category</a:t>
-            </a:r>
-          </a:p>
-        </p:txBody>
-      </p:sp>
-      <p:sp>
-        <p:nvSpPr>
-          <p:cNvPr id="3" name="Content Placeholder 2">
-            <a:extLst>
-              <a:ext uri="{FF2B5EF4-FFF2-40B4-BE49-F238E27FC236}">
-                <a16:creationId xmlns:a16="http://schemas.microsoft.com/office/drawing/2014/main" id="{7F2A3921-2139-443A-B460-616AD877848F}"/>
+              <a:t>Profile</a:t>
+            </a:r>
+          </a:p>
+        </p:txBody>
+      </p:sp>
+      <p:sp>
+        <p:nvSpPr>
+          <p:cNvPr id="5" name="Content Placeholder 4">
+            <a:extLst>
+              <a:ext uri="{FF2B5EF4-FFF2-40B4-BE49-F238E27FC236}">
+                <a16:creationId xmlns:a16="http://schemas.microsoft.com/office/drawing/2014/main" id="{E93B38C2-FCFB-45E1-BE31-88CC2FA69C1E}"/>
               </a:ext>
             </a:extLst>
           </p:cNvPr>
@@ -5340,20 +5510,31 @@
           <a:lstStyle/>
           <a:p>
             <a:r>
+              <a:rPr lang="en-GB" dirty="0" err="1"/>
+              <a:t>Firstname</a:t>
+            </a:r>
+            <a:endParaRPr lang="en-GB" dirty="0"/>
+          </a:p>
+          <a:p>
+            <a:r>
+              <a:rPr lang="en-GB" dirty="0" err="1"/>
+              <a:t>Lastname</a:t>
+            </a:r>
+            <a:r>
               <a:rPr lang="en-GB" dirty="0"/>
-              <a:t>Name </a:t>
+              <a:t> </a:t>
             </a:r>
           </a:p>
           <a:p>
             <a:r>
               <a:rPr lang="en-GB" dirty="0"/>
-              <a:t>Description</a:t>
-            </a:r>
-          </a:p>
-          <a:p>
-            <a:r>
-              <a:rPr lang="en-GB" dirty="0" err="1"/>
-              <a:t>Color</a:t>
+              <a:t>Age</a:t>
+            </a:r>
+          </a:p>
+          <a:p>
+            <a:r>
+              <a:rPr lang="en-GB"/>
+              <a:t>User</a:t>
             </a:r>
             <a:endParaRPr lang="en-GB" dirty="0"/>
           </a:p>
@@ -5362,7 +5543,7 @@
     </p:spTree>
     <p:extLst>
       <p:ext uri="{BB962C8B-B14F-4D97-AF65-F5344CB8AC3E}">
-        <p14:creationId xmlns:p14="http://schemas.microsoft.com/office/powerpoint/2010/main" val="2102804617"/>
+        <p14:creationId xmlns:p14="http://schemas.microsoft.com/office/powerpoint/2010/main" val="3368136810"/>
       </p:ext>
     </p:extLst>
   </p:cSld>
@@ -5394,7 +5575,7 @@
           <p:cNvPr id="4" name="Object 3" hidden="1">
             <a:extLst>
               <a:ext uri="{FF2B5EF4-FFF2-40B4-BE49-F238E27FC236}">
-                <a16:creationId xmlns:a16="http://schemas.microsoft.com/office/drawing/2014/main" id="{AD039125-C7BE-4241-B30F-5EC9EFB4DD12}"/>
+                <a16:creationId xmlns:a16="http://schemas.microsoft.com/office/drawing/2014/main" id="{89138ECF-FAC1-4D67-BE04-02A1B8A4FED4}"/>
               </a:ext>
             </a:extLst>
           </p:cNvPr>
@@ -5407,7 +5588,7 @@
             </p:custDataLst>
             <p:extLst>
               <p:ext uri="{D42A27DB-BD31-4B8C-83A1-F6EECF244321}">
-                <p14:modId xmlns:p14="http://schemas.microsoft.com/office/powerpoint/2010/main" val="2031764387"/>
+                <p14:modId xmlns:p14="http://schemas.microsoft.com/office/powerpoint/2010/main" val="3428019457"/>
               </p:ext>
             </p:extLst>
           </p:nvPr>
@@ -5420,7 +5601,7 @@
           <a:graphicData uri="http://schemas.openxmlformats.org/presentationml/2006/ole">
             <mc:AlternateContent xmlns:mc="http://schemas.openxmlformats.org/markup-compatibility/2006">
               <mc:Choice xmlns:v="urn:schemas-microsoft-com:vml" Requires="v">
-                <p:oleObj spid="_x0000_s13315" name="think-cell Slide" r:id="rId4" imgW="415" imgH="416" progId="TCLayout.ActiveDocument.1">
+                <p:oleObj spid="_x0000_s9226" name="think-cell Slide" r:id="rId4" imgW="415" imgH="416" progId="TCLayout.ActiveDocument.1">
                   <p:embed/>
                 </p:oleObj>
               </mc:Choice>
@@ -5460,7 +5641,7 @@
           <p:cNvPr id="2" name="Title 1">
             <a:extLst>
               <a:ext uri="{FF2B5EF4-FFF2-40B4-BE49-F238E27FC236}">
-                <a16:creationId xmlns:a16="http://schemas.microsoft.com/office/drawing/2014/main" id="{C7E2027B-26E7-4920-8536-4A2F8304954E}"/>
+                <a16:creationId xmlns:a16="http://schemas.microsoft.com/office/drawing/2014/main" id="{F26FBC1D-F191-4FAB-B578-BD4E00608B26}"/>
               </a:ext>
             </a:extLst>
           </p:cNvPr>
@@ -5477,10 +5658,9 @@
           <a:lstStyle/>
           <a:p>
             <a:r>
-              <a:rPr lang="en-GB" dirty="0" err="1"/>
-              <a:t>Category_Person</a:t>
-            </a:r>
-            <a:endParaRPr lang="en-GB" dirty="0"/>
+              <a:rPr lang="en-GB" dirty="0"/>
+              <a:t>Category</a:t>
+            </a:r>
           </a:p>
         </p:txBody>
       </p:sp>
@@ -5489,7 +5669,7 @@
           <p:cNvPr id="3" name="Content Placeholder 2">
             <a:extLst>
               <a:ext uri="{FF2B5EF4-FFF2-40B4-BE49-F238E27FC236}">
-                <a16:creationId xmlns:a16="http://schemas.microsoft.com/office/drawing/2014/main" id="{2376575B-3421-4443-BBA4-DFDBD6BDEB98}"/>
+                <a16:creationId xmlns:a16="http://schemas.microsoft.com/office/drawing/2014/main" id="{7F2A3921-2139-443A-B460-616AD877848F}"/>
               </a:ext>
             </a:extLst>
           </p:cNvPr>
@@ -5504,16 +5684,6 @@
         <p:txBody>
           <a:bodyPr/>
           <a:lstStyle/>
-          <a:p>
-            <a:r>
-              <a:rPr lang="en-GB" dirty="0" err="1"/>
-              <a:t>Category_ID</a:t>
-            </a:r>
-            <a:r>
-              <a:rPr lang="en-GB" dirty="0"/>
-              <a:t> (can be null)</a:t>
-            </a:r>
-          </a:p>
           <a:p>
             <a:r>
               <a:rPr lang="en-GB" dirty="0"/>
@@ -5531,16 +5701,6 @@
               <a:rPr lang="en-GB" dirty="0" err="1"/>
               <a:t>Color</a:t>
             </a:r>
-            <a:endParaRPr lang="en-GB" dirty="0"/>
-          </a:p>
-          <a:p>
-            <a:r>
-              <a:rPr lang="en-GB" dirty="0" err="1"/>
-              <a:t>Profile_ID</a:t>
-            </a:r>
-            <a:endParaRPr lang="en-GB" dirty="0"/>
-          </a:p>
-          <a:p>
             <a:endParaRPr lang="en-GB" dirty="0"/>
           </a:p>
         </p:txBody>
@@ -5548,7 +5708,7 @@
     </p:spTree>
     <p:extLst>
       <p:ext uri="{BB962C8B-B14F-4D97-AF65-F5344CB8AC3E}">
-        <p14:creationId xmlns:p14="http://schemas.microsoft.com/office/powerpoint/2010/main" val="2450218261"/>
+        <p14:creationId xmlns:p14="http://schemas.microsoft.com/office/powerpoint/2010/main" val="2102804617"/>
       </p:ext>
     </p:extLst>
   </p:cSld>
@@ -5589,6 +5749,12 @@
 </file>
 
 <file path=ppt/tags/tag14.xml><?xml version="1.0" encoding="utf-8"?>
+<p:tagLst xmlns:a="http://schemas.openxmlformats.org/drawingml/2006/main" xmlns:r="http://schemas.openxmlformats.org/officeDocument/2006/relationships" xmlns:p="http://schemas.openxmlformats.org/presentationml/2006/main">
+  <p:tag name="THINKCELLSHAPEDONOTDELETE" val="thinkcellActiveDocDoNotDelete"/>
+</p:tagLst>
+</file>
+
+<file path=ppt/tags/tag15.xml><?xml version="1.0" encoding="utf-8"?>
 <p:tagLst xmlns:a="http://schemas.openxmlformats.org/drawingml/2006/main" xmlns:r="http://schemas.openxmlformats.org/officeDocument/2006/relationships" xmlns:p="http://schemas.openxmlformats.org/presentationml/2006/main">
   <p:tag name="THINKCELLSHAPEDONOTDELETE" val="thinkcellActiveDocDoNotDelete"/>
 </p:tagLst>

</xml_diff>

<commit_message>
Test with Template at Login
</commit_message>
<xml_diff>
--- a/CareerPlanApp.pptx
+++ b/CareerPlanApp.pptx
@@ -2828,7 +2828,7 @@
           <a:graphicData uri="http://schemas.openxmlformats.org/presentationml/2006/ole">
             <mc:AlternateContent xmlns:mc="http://schemas.openxmlformats.org/markup-compatibility/2006">
               <mc:Choice xmlns:v="urn:schemas-microsoft-com:vml" Requires="v">
-                <p:oleObj spid="_x0000_s1045" name="think-cell Slide" r:id="rId15" imgW="415" imgH="416" progId="TCLayout.ActiveDocument.1">
+                <p:oleObj spid="_x0000_s1046" name="think-cell Slide" r:id="rId15" imgW="415" imgH="416" progId="TCLayout.ActiveDocument.1">
                   <p:embed/>
                 </p:oleObj>
               </mc:Choice>
@@ -3459,7 +3459,7 @@
           <a:graphicData uri="http://schemas.openxmlformats.org/presentationml/2006/ole">
             <mc:AlternateContent xmlns:mc="http://schemas.openxmlformats.org/markup-compatibility/2006">
               <mc:Choice xmlns:v="urn:schemas-microsoft-com:vml" Requires="v">
-                <p:oleObj spid="_x0000_s2069" name="think-cell Slide" r:id="rId4" imgW="415" imgH="416" progId="TCLayout.ActiveDocument.1">
+                <p:oleObj spid="_x0000_s2070" name="think-cell Slide" r:id="rId4" imgW="415" imgH="416" progId="TCLayout.ActiveDocument.1">
                   <p:embed/>
                 </p:oleObj>
               </mc:Choice>
@@ -3616,7 +3616,7 @@
           <a:graphicData uri="http://schemas.openxmlformats.org/presentationml/2006/ole">
             <mc:AlternateContent xmlns:mc="http://schemas.openxmlformats.org/markup-compatibility/2006">
               <mc:Choice xmlns:v="urn:schemas-microsoft-com:vml" Requires="v">
-                <p:oleObj spid="_x0000_s13317" name="think-cell Slide" r:id="rId4" imgW="415" imgH="416" progId="TCLayout.ActiveDocument.1">
+                <p:oleObj spid="_x0000_s13318" name="think-cell Slide" r:id="rId4" imgW="415" imgH="416" progId="TCLayout.ActiveDocument.1">
                   <p:embed/>
                 </p:oleObj>
               </mc:Choice>
@@ -3802,7 +3802,7 @@
           <a:graphicData uri="http://schemas.openxmlformats.org/presentationml/2006/ole">
             <mc:AlternateContent xmlns:mc="http://schemas.openxmlformats.org/markup-compatibility/2006">
               <mc:Choice xmlns:v="urn:schemas-microsoft-com:vml" Requires="v">
-                <p:oleObj spid="_x0000_s10250" name="think-cell Slide" r:id="rId4" imgW="415" imgH="416" progId="TCLayout.ActiveDocument.1">
+                <p:oleObj spid="_x0000_s10251" name="think-cell Slide" r:id="rId4" imgW="415" imgH="416" progId="TCLayout.ActiveDocument.1">
                   <p:embed/>
                 </p:oleObj>
               </mc:Choice>
@@ -3991,7 +3991,7 @@
           <a:graphicData uri="http://schemas.openxmlformats.org/presentationml/2006/ole">
             <mc:AlternateContent xmlns:mc="http://schemas.openxmlformats.org/markup-compatibility/2006">
               <mc:Choice xmlns:v="urn:schemas-microsoft-com:vml" Requires="v">
-                <p:oleObj spid="_x0000_s11272" name="think-cell Slide" r:id="rId4" imgW="415" imgH="416" progId="TCLayout.ActiveDocument.1">
+                <p:oleObj spid="_x0000_s11273" name="think-cell Slide" r:id="rId4" imgW="415" imgH="416" progId="TCLayout.ActiveDocument.1">
                   <p:embed/>
                 </p:oleObj>
               </mc:Choice>
@@ -4185,7 +4185,7 @@
           <a:graphicData uri="http://schemas.openxmlformats.org/presentationml/2006/ole">
             <mc:AlternateContent xmlns:mc="http://schemas.openxmlformats.org/markup-compatibility/2006">
               <mc:Choice xmlns:v="urn:schemas-microsoft-com:vml" Requires="v">
-                <p:oleObj spid="_x0000_s12294" name="think-cell Slide" r:id="rId4" imgW="415" imgH="416" progId="TCLayout.ActiveDocument.1">
+                <p:oleObj spid="_x0000_s12295" name="think-cell Slide" r:id="rId4" imgW="415" imgH="416" progId="TCLayout.ActiveDocument.1">
                   <p:embed/>
                 </p:oleObj>
               </mc:Choice>
@@ -4383,7 +4383,7 @@
           <a:graphicData uri="http://schemas.openxmlformats.org/presentationml/2006/ole">
             <mc:AlternateContent xmlns:mc="http://schemas.openxmlformats.org/markup-compatibility/2006">
               <mc:Choice xmlns:v="urn:schemas-microsoft-com:vml" Requires="v">
-                <p:oleObj spid="_x0000_s3093" name="think-cell Slide" r:id="rId4" imgW="415" imgH="416" progId="TCLayout.ActiveDocument.1">
+                <p:oleObj spid="_x0000_s3094" name="think-cell Slide" r:id="rId4" imgW="415" imgH="416" progId="TCLayout.ActiveDocument.1">
                   <p:embed/>
                 </p:oleObj>
               </mc:Choice>
@@ -4570,7 +4570,7 @@
           <a:graphicData uri="http://schemas.openxmlformats.org/presentationml/2006/ole">
             <mc:AlternateContent xmlns:mc="http://schemas.openxmlformats.org/markup-compatibility/2006">
               <mc:Choice xmlns:v="urn:schemas-microsoft-com:vml" Requires="v">
-                <p:oleObj spid="_x0000_s4117" name="think-cell Slide" r:id="rId4" imgW="415" imgH="416" progId="TCLayout.ActiveDocument.1">
+                <p:oleObj spid="_x0000_s4118" name="think-cell Slide" r:id="rId4" imgW="415" imgH="416" progId="TCLayout.ActiveDocument.1">
                   <p:embed/>
                 </p:oleObj>
               </mc:Choice>
@@ -4725,7 +4725,7 @@
           <a:graphicData uri="http://schemas.openxmlformats.org/presentationml/2006/ole">
             <mc:AlternateContent xmlns:mc="http://schemas.openxmlformats.org/markup-compatibility/2006">
               <mc:Choice xmlns:v="urn:schemas-microsoft-com:vml" Requires="v">
-                <p:oleObj spid="_x0000_s5141" name="think-cell Slide" r:id="rId4" imgW="415" imgH="416" progId="TCLayout.ActiveDocument.1">
+                <p:oleObj spid="_x0000_s5142" name="think-cell Slide" r:id="rId4" imgW="415" imgH="416" progId="TCLayout.ActiveDocument.1">
                   <p:embed/>
                 </p:oleObj>
               </mc:Choice>
@@ -4918,7 +4918,7 @@
           <a:graphicData uri="http://schemas.openxmlformats.org/presentationml/2006/ole">
             <mc:AlternateContent xmlns:mc="http://schemas.openxmlformats.org/markup-compatibility/2006">
               <mc:Choice xmlns:v="urn:schemas-microsoft-com:vml" Requires="v">
-                <p:oleObj spid="_x0000_s6163" name="think-cell Slide" r:id="rId4" imgW="415" imgH="416" progId="TCLayout.ActiveDocument.1">
+                <p:oleObj spid="_x0000_s6164" name="think-cell Slide" r:id="rId4" imgW="415" imgH="416" progId="TCLayout.ActiveDocument.1">
                   <p:embed/>
                 </p:oleObj>
               </mc:Choice>
@@ -5112,7 +5112,7 @@
           <a:graphicData uri="http://schemas.openxmlformats.org/presentationml/2006/ole">
             <mc:AlternateContent xmlns:mc="http://schemas.openxmlformats.org/markup-compatibility/2006">
               <mc:Choice xmlns:v="urn:schemas-microsoft-com:vml" Requires="v">
-                <p:oleObj spid="_x0000_s7178" name="think-cell Slide" r:id="rId4" imgW="415" imgH="416" progId="TCLayout.ActiveDocument.1">
+                <p:oleObj spid="_x0000_s7179" name="think-cell Slide" r:id="rId4" imgW="415" imgH="416" progId="TCLayout.ActiveDocument.1">
                   <p:embed/>
                 </p:oleObj>
               </mc:Choice>
@@ -5261,7 +5261,7 @@
           <a:graphicData uri="http://schemas.openxmlformats.org/presentationml/2006/ole">
             <mc:AlternateContent xmlns:mc="http://schemas.openxmlformats.org/markup-compatibility/2006">
               <mc:Choice xmlns:v="urn:schemas-microsoft-com:vml" Requires="v">
-                <p:oleObj spid="_x0000_s14338" name="think-cell Slide" r:id="rId4" imgW="415" imgH="416" progId="TCLayout.ActiveDocument.1">
+                <p:oleObj spid="_x0000_s14340" name="think-cell Slide" r:id="rId4" imgW="415" imgH="416" progId="TCLayout.ActiveDocument.1">
                   <p:embed/>
                 </p:oleObj>
               </mc:Choice>
@@ -5425,7 +5425,7 @@
           <a:graphicData uri="http://schemas.openxmlformats.org/presentationml/2006/ole">
             <mc:AlternateContent xmlns:mc="http://schemas.openxmlformats.org/markup-compatibility/2006">
               <mc:Choice xmlns:v="urn:schemas-microsoft-com:vml" Requires="v">
-                <p:oleObj spid="_x0000_s8202" name="think-cell Slide" r:id="rId4" imgW="415" imgH="416" progId="TCLayout.ActiveDocument.1">
+                <p:oleObj spid="_x0000_s8204" name="think-cell Slide" r:id="rId4" imgW="415" imgH="416" progId="TCLayout.ActiveDocument.1">
                   <p:embed/>
                 </p:oleObj>
               </mc:Choice>
@@ -5533,10 +5533,9 @@
           </a:p>
           <a:p>
             <a:r>
-              <a:rPr lang="en-GB"/>
+              <a:rPr lang="en-GB" dirty="0"/>
               <a:t>User</a:t>
             </a:r>
-            <a:endParaRPr lang="en-GB" dirty="0"/>
           </a:p>
         </p:txBody>
       </p:sp>
@@ -5601,7 +5600,7 @@
           <a:graphicData uri="http://schemas.openxmlformats.org/presentationml/2006/ole">
             <mc:AlternateContent xmlns:mc="http://schemas.openxmlformats.org/markup-compatibility/2006">
               <mc:Choice xmlns:v="urn:schemas-microsoft-com:vml" Requires="v">
-                <p:oleObj spid="_x0000_s9226" name="think-cell Slide" r:id="rId4" imgW="415" imgH="416" progId="TCLayout.ActiveDocument.1">
+                <p:oleObj spid="_x0000_s9227" name="think-cell Slide" r:id="rId4" imgW="415" imgH="416" progId="TCLayout.ActiveDocument.1">
                   <p:embed/>
                 </p:oleObj>
               </mc:Choice>

</xml_diff>